<commit_message>
update search, remove products at homepage, update form at add and edit product page
</commit_message>
<xml_diff>
--- a/l-note.pptx
+++ b/l-note.pptx
@@ -271,7 +271,7 @@
           <a:p>
             <a:fld id="{457CA80E-B445-4CC8-9828-88F1B53B26D6}" type="datetimeFigureOut">
               <a:rPr lang="id-ID" smtClean="0"/>
-              <a:t>07/07/2022</a:t>
+              <a:t>08/07/2022</a:t>
             </a:fld>
             <a:endParaRPr lang="id-ID"/>
           </a:p>
@@ -471,7 +471,7 @@
           <a:p>
             <a:fld id="{457CA80E-B445-4CC8-9828-88F1B53B26D6}" type="datetimeFigureOut">
               <a:rPr lang="id-ID" smtClean="0"/>
-              <a:t>07/07/2022</a:t>
+              <a:t>08/07/2022</a:t>
             </a:fld>
             <a:endParaRPr lang="id-ID"/>
           </a:p>
@@ -681,7 +681,7 @@
           <a:p>
             <a:fld id="{457CA80E-B445-4CC8-9828-88F1B53B26D6}" type="datetimeFigureOut">
               <a:rPr lang="id-ID" smtClean="0"/>
-              <a:t>07/07/2022</a:t>
+              <a:t>08/07/2022</a:t>
             </a:fld>
             <a:endParaRPr lang="id-ID"/>
           </a:p>
@@ -881,7 +881,7 @@
           <a:p>
             <a:fld id="{457CA80E-B445-4CC8-9828-88F1B53B26D6}" type="datetimeFigureOut">
               <a:rPr lang="id-ID" smtClean="0"/>
-              <a:t>07/07/2022</a:t>
+              <a:t>08/07/2022</a:t>
             </a:fld>
             <a:endParaRPr lang="id-ID"/>
           </a:p>
@@ -1157,7 +1157,7 @@
           <a:p>
             <a:fld id="{457CA80E-B445-4CC8-9828-88F1B53B26D6}" type="datetimeFigureOut">
               <a:rPr lang="id-ID" smtClean="0"/>
-              <a:t>07/07/2022</a:t>
+              <a:t>08/07/2022</a:t>
             </a:fld>
             <a:endParaRPr lang="id-ID"/>
           </a:p>
@@ -1425,7 +1425,7 @@
           <a:p>
             <a:fld id="{457CA80E-B445-4CC8-9828-88F1B53B26D6}" type="datetimeFigureOut">
               <a:rPr lang="id-ID" smtClean="0"/>
-              <a:t>07/07/2022</a:t>
+              <a:t>08/07/2022</a:t>
             </a:fld>
             <a:endParaRPr lang="id-ID"/>
           </a:p>
@@ -1840,7 +1840,7 @@
           <a:p>
             <a:fld id="{457CA80E-B445-4CC8-9828-88F1B53B26D6}" type="datetimeFigureOut">
               <a:rPr lang="id-ID" smtClean="0"/>
-              <a:t>07/07/2022</a:t>
+              <a:t>08/07/2022</a:t>
             </a:fld>
             <a:endParaRPr lang="id-ID"/>
           </a:p>
@@ -1982,7 +1982,7 @@
           <a:p>
             <a:fld id="{457CA80E-B445-4CC8-9828-88F1B53B26D6}" type="datetimeFigureOut">
               <a:rPr lang="id-ID" smtClean="0"/>
-              <a:t>07/07/2022</a:t>
+              <a:t>08/07/2022</a:t>
             </a:fld>
             <a:endParaRPr lang="id-ID"/>
           </a:p>
@@ -2095,7 +2095,7 @@
           <a:p>
             <a:fld id="{457CA80E-B445-4CC8-9828-88F1B53B26D6}" type="datetimeFigureOut">
               <a:rPr lang="id-ID" smtClean="0"/>
-              <a:t>07/07/2022</a:t>
+              <a:t>08/07/2022</a:t>
             </a:fld>
             <a:endParaRPr lang="id-ID"/>
           </a:p>
@@ -2408,7 +2408,7 @@
           <a:p>
             <a:fld id="{457CA80E-B445-4CC8-9828-88F1B53B26D6}" type="datetimeFigureOut">
               <a:rPr lang="id-ID" smtClean="0"/>
-              <a:t>07/07/2022</a:t>
+              <a:t>08/07/2022</a:t>
             </a:fld>
             <a:endParaRPr lang="id-ID"/>
           </a:p>
@@ -2697,7 +2697,7 @@
           <a:p>
             <a:fld id="{457CA80E-B445-4CC8-9828-88F1B53B26D6}" type="datetimeFigureOut">
               <a:rPr lang="id-ID" smtClean="0"/>
-              <a:t>07/07/2022</a:t>
+              <a:t>08/07/2022</a:t>
             </a:fld>
             <a:endParaRPr lang="id-ID"/>
           </a:p>
@@ -2943,7 +2943,7 @@
           <a:p>
             <a:fld id="{457CA80E-B445-4CC8-9828-88F1B53B26D6}" type="datetimeFigureOut">
               <a:rPr lang="id-ID" smtClean="0"/>
-              <a:t>07/07/2022</a:t>
+              <a:t>08/07/2022</a:t>
             </a:fld>
             <a:endParaRPr lang="id-ID"/>
           </a:p>
@@ -3573,14 +3573,14 @@
             <p:ph idx="1"/>
             <p:extLst>
               <p:ext uri="{D42A27DB-BD31-4B8C-83A1-F6EECF244321}">
-                <p14:modId xmlns:p14="http://schemas.microsoft.com/office/powerpoint/2010/main" val="1909772758"/>
+                <p14:modId xmlns:p14="http://schemas.microsoft.com/office/powerpoint/2010/main" val="2661391176"/>
               </p:ext>
             </p:extLst>
           </p:nvPr>
         </p:nvGraphicFramePr>
         <p:xfrm>
           <a:off x="595438" y="1821180"/>
-          <a:ext cx="10919528" cy="3649980"/>
+          <a:ext cx="10919528" cy="3215640"/>
         </p:xfrm>
         <a:graphic>
           <a:graphicData uri="http://schemas.openxmlformats.org/drawingml/2006/table">
@@ -3935,7 +3935,7 @@
                         </a:spcAft>
                       </a:pPr>
                       <a:r>
-                        <a:rPr lang="id-ID" sz="1600" b="0" u="none" strike="noStrike">
+                        <a:rPr lang="id-ID" sz="1600" b="0" u="none" strike="noStrike" dirty="0">
                           <a:solidFill>
                             <a:srgbClr val="0F0C0D"/>
                           </a:solidFill>
@@ -3943,7 +3943,7 @@
                         </a:rPr>
                         <a:t>GET</a:t>
                       </a:r>
-                      <a:endParaRPr lang="id-ID">
+                      <a:endParaRPr lang="id-ID" dirty="0">
                         <a:effectLst/>
                       </a:endParaRPr>
                     </a:p>
@@ -4029,241 +4029,6 @@
                   </a:ext>
                 </a:extLst>
               </a:tr>
-              <a:tr h="368879">
-                <a:tc>
-                  <a:txBody>
-                    <a:bodyPr/>
-                    <a:lstStyle/>
-                    <a:p>
-                      <a:r>
-                        <a:rPr lang="en-US" dirty="0"/>
-                        <a:t>3.</a:t>
-                      </a:r>
-                      <a:endParaRPr lang="id-ID" dirty="0"/>
-                    </a:p>
-                  </a:txBody>
-                  <a:tcPr/>
-                </a:tc>
-                <a:tc>
-                  <a:txBody>
-                    <a:bodyPr/>
-                    <a:lstStyle/>
-                    <a:p>
-                      <a:pPr rtl="0" fontAlgn="ctr">
-                        <a:spcBef>
-                          <a:spcPts val="0"/>
-                        </a:spcBef>
-                        <a:spcAft>
-                          <a:spcPts val="0"/>
-                        </a:spcAft>
-                      </a:pPr>
-                      <a:r>
-                        <a:rPr lang="id-ID" sz="1600" b="0" u="none" strike="noStrike">
-                          <a:solidFill>
-                            <a:srgbClr val="0F0C0D"/>
-                          </a:solidFill>
-                          <a:effectLst/>
-                        </a:rPr>
-                        <a:t>POST</a:t>
-                      </a:r>
-                      <a:endParaRPr lang="id-ID">
-                        <a:effectLst/>
-                      </a:endParaRPr>
-                    </a:p>
-                  </a:txBody>
-                  <a:tcPr marL="95250" marR="95250" marT="95250" marB="95250" anchor="ctr"/>
-                </a:tc>
-                <a:tc>
-                  <a:txBody>
-                    <a:bodyPr/>
-                    <a:lstStyle/>
-                    <a:p>
-                      <a:pPr rtl="0" fontAlgn="ctr">
-                        <a:spcBef>
-                          <a:spcPts val="0"/>
-                        </a:spcBef>
-                        <a:spcAft>
-                          <a:spcPts val="0"/>
-                        </a:spcAft>
-                      </a:pPr>
-                      <a:r>
-                        <a:rPr lang="id-ID" sz="1600" b="1" u="none" strike="noStrike" dirty="0">
-                          <a:solidFill>
-                            <a:srgbClr val="0F0C0D"/>
-                          </a:solidFill>
-                          <a:effectLst/>
-                          <a:latin typeface="Courier New" panose="02070309020205020404" pitchFamily="49" charset="0"/>
-                          <a:cs typeface="Courier New" panose="02070309020205020404" pitchFamily="49" charset="0"/>
-                        </a:rPr>
-                        <a:t>localhost:3000/</a:t>
-                      </a:r>
-                      <a:r>
-                        <a:rPr lang="id-ID" sz="1600" b="1" u="none" strike="noStrike" dirty="0" err="1">
-                          <a:solidFill>
-                            <a:srgbClr val="0F0C0D"/>
-                          </a:solidFill>
-                          <a:effectLst/>
-                          <a:latin typeface="Courier New" panose="02070309020205020404" pitchFamily="49" charset="0"/>
-                          <a:cs typeface="Courier New" panose="02070309020205020404" pitchFamily="49" charset="0"/>
-                        </a:rPr>
-                        <a:t>orders</a:t>
-                      </a:r>
-                      <a:r>
-                        <a:rPr lang="id-ID" sz="1600" b="1" u="none" strike="noStrike" dirty="0">
-                          <a:solidFill>
-                            <a:srgbClr val="0F0C0D"/>
-                          </a:solidFill>
-                          <a:effectLst/>
-                          <a:latin typeface="Courier New" panose="02070309020205020404" pitchFamily="49" charset="0"/>
-                          <a:cs typeface="Courier New" panose="02070309020205020404" pitchFamily="49" charset="0"/>
-                        </a:rPr>
-                        <a:t>/</a:t>
-                      </a:r>
-                      <a:r>
-                        <a:rPr lang="id-ID" sz="1600" b="1" u="none" strike="noStrike" dirty="0" err="1">
-                          <a:solidFill>
-                            <a:srgbClr val="0F0C0D"/>
-                          </a:solidFill>
-                          <a:effectLst/>
-                          <a:latin typeface="Courier New" panose="02070309020205020404" pitchFamily="49" charset="0"/>
-                          <a:cs typeface="Courier New" panose="02070309020205020404" pitchFamily="49" charset="0"/>
-                        </a:rPr>
-                        <a:t>checkout</a:t>
-                      </a:r>
-                      <a:endParaRPr lang="id-ID" dirty="0">
-                        <a:effectLst/>
-                        <a:latin typeface="Courier New" panose="02070309020205020404" pitchFamily="49" charset="0"/>
-                        <a:cs typeface="Courier New" panose="02070309020205020404" pitchFamily="49" charset="0"/>
-                      </a:endParaRPr>
-                    </a:p>
-                  </a:txBody>
-                  <a:tcPr marL="95250" marR="95250" marT="95250" marB="95250" anchor="ctr"/>
-                </a:tc>
-                <a:tc>
-                  <a:txBody>
-                    <a:bodyPr/>
-                    <a:lstStyle/>
-                    <a:p>
-                      <a:pPr rtl="0" fontAlgn="ctr">
-                        <a:spcBef>
-                          <a:spcPts val="0"/>
-                        </a:spcBef>
-                        <a:spcAft>
-                          <a:spcPts val="0"/>
-                        </a:spcAft>
-                      </a:pPr>
-                      <a:r>
-                        <a:rPr lang="id-ID" sz="1600" b="0" u="none" strike="noStrike" dirty="0">
-                          <a:solidFill>
-                            <a:srgbClr val="000000"/>
-                          </a:solidFill>
-                          <a:effectLst/>
-                        </a:rPr>
-                        <a:t>Membuat order</a:t>
-                      </a:r>
-                      <a:r>
-                        <a:rPr lang="en-US" sz="1600" b="0" u="none" strike="noStrike" dirty="0">
-                          <a:solidFill>
-                            <a:srgbClr val="000000"/>
-                          </a:solidFill>
-                          <a:effectLst/>
-                        </a:rPr>
-                        <a:t> + </a:t>
-                      </a:r>
-                      <a:r>
-                        <a:rPr lang="en-US" sz="1600" b="0" u="none" strike="noStrike" dirty="0" err="1">
-                          <a:solidFill>
-                            <a:srgbClr val="000000"/>
-                          </a:solidFill>
-                          <a:effectLst/>
-                        </a:rPr>
-                        <a:t>kalkulasi</a:t>
-                      </a:r>
-                      <a:r>
-                        <a:rPr lang="en-US" sz="1600" b="0" u="none" strike="noStrike" dirty="0">
-                          <a:solidFill>
-                            <a:srgbClr val="000000"/>
-                          </a:solidFill>
-                          <a:effectLst/>
-                        </a:rPr>
-                        <a:t> </a:t>
-                      </a:r>
-                      <a:r>
-                        <a:rPr lang="en-US" sz="1600" b="0" u="none" strike="noStrike" dirty="0" err="1">
-                          <a:solidFill>
-                            <a:srgbClr val="000000"/>
-                          </a:solidFill>
-                          <a:effectLst/>
-                        </a:rPr>
-                        <a:t>diskon</a:t>
-                      </a:r>
-                      <a:r>
-                        <a:rPr lang="en-US" sz="1600" b="0" u="none" strike="noStrike" dirty="0">
-                          <a:solidFill>
-                            <a:srgbClr val="000000"/>
-                          </a:solidFill>
-                          <a:effectLst/>
-                        </a:rPr>
-                        <a:t>, </a:t>
-                      </a:r>
-                      <a:r>
-                        <a:rPr lang="en-US" sz="1600" b="0" u="none" strike="noStrike" dirty="0" err="1">
-                          <a:solidFill>
-                            <a:srgbClr val="000000"/>
-                          </a:solidFill>
-                          <a:effectLst/>
-                        </a:rPr>
-                        <a:t>pajak</a:t>
-                      </a:r>
-                      <a:r>
-                        <a:rPr lang="en-US" sz="1600" b="0" u="none" strike="noStrike" dirty="0">
-                          <a:solidFill>
-                            <a:srgbClr val="000000"/>
-                          </a:solidFill>
-                          <a:effectLst/>
-                        </a:rPr>
-                        <a:t>, dan </a:t>
-                      </a:r>
-                      <a:r>
-                        <a:rPr lang="en-US" sz="1600" b="0" u="none" strike="noStrike" dirty="0" err="1">
-                          <a:solidFill>
-                            <a:srgbClr val="000000"/>
-                          </a:solidFill>
-                          <a:effectLst/>
-                        </a:rPr>
-                        <a:t>jumlah</a:t>
-                      </a:r>
-                      <a:r>
-                        <a:rPr lang="en-US" sz="1600" b="0" u="none" strike="noStrike" dirty="0">
-                          <a:solidFill>
-                            <a:srgbClr val="000000"/>
-                          </a:solidFill>
-                          <a:effectLst/>
-                        </a:rPr>
-                        <a:t> </a:t>
-                      </a:r>
-                      <a:r>
-                        <a:rPr lang="en-US" sz="1600" b="0" u="none" strike="noStrike" dirty="0" err="1">
-                          <a:solidFill>
-                            <a:srgbClr val="000000"/>
-                          </a:solidFill>
-                          <a:effectLst/>
-                        </a:rPr>
-                        <a:t>harga</a:t>
-                      </a:r>
-                      <a:endParaRPr lang="id-ID" dirty="0">
-                        <a:effectLst/>
-                      </a:endParaRPr>
-                    </a:p>
-                  </a:txBody>
-                  <a:tcPr marL="95250" marR="95250" marT="95250" marB="95250" anchor="ctr"/>
-                </a:tc>
-                <a:extLst>
-                  <a:ext uri="{0D108BD9-81ED-4DB2-BD59-A6C34878D82A}">
-                    <a16:rowId xmlns:a16="http://schemas.microsoft.com/office/drawing/2014/main" val="2837211186"/>
-                  </a:ext>
-                </a:extLst>
-              </a:tr>
               <a:tr h="425858">
                 <a:tc>
                   <a:txBody>
@@ -4272,7 +4037,7 @@
                     <a:p>
                       <a:r>
                         <a:rPr lang="en-US" dirty="0"/>
-                        <a:t>4.</a:t>
+                        <a:t>3.</a:t>
                       </a:r>
                       <a:endParaRPr lang="id-ID" dirty="0"/>
                     </a:p>
@@ -4417,7 +4182,7 @@
                     <a:p>
                       <a:r>
                         <a:rPr lang="en-US" sz="1600" dirty="0"/>
-                        <a:t>5.</a:t>
+                        <a:t>4.</a:t>
                       </a:r>
                       <a:endParaRPr lang="id-ID" sz="1600" dirty="0"/>
                     </a:p>
@@ -4550,7 +4315,7 @@
                     <a:p>
                       <a:r>
                         <a:rPr lang="en-US" dirty="0"/>
-                        <a:t>6.</a:t>
+                        <a:t>5.</a:t>
                       </a:r>
                       <a:endParaRPr lang="id-ID" dirty="0"/>
                     </a:p>
@@ -4695,7 +4460,7 @@
                     <a:p>
                       <a:r>
                         <a:rPr lang="en-US" dirty="0"/>
-                        <a:t>7.</a:t>
+                        <a:t>6.</a:t>
                       </a:r>
                       <a:endParaRPr lang="id-ID" dirty="0"/>
                     </a:p>
@@ -4716,7 +4481,7 @@
                         </a:spcAft>
                       </a:pPr>
                       <a:r>
-                        <a:rPr lang="id-ID" sz="1600" b="0" u="none" strike="noStrike">
+                        <a:rPr lang="id-ID" sz="1600" b="0" u="none" strike="noStrike" dirty="0">
                           <a:solidFill>
                             <a:srgbClr val="0F0C0D"/>
                           </a:solidFill>
@@ -4724,7 +4489,7 @@
                         </a:rPr>
                         <a:t>GET</a:t>
                       </a:r>
-                      <a:endParaRPr lang="id-ID">
+                      <a:endParaRPr lang="id-ID" dirty="0">
                         <a:effectLst/>
                       </a:endParaRPr>
                     </a:p>
@@ -5803,6 +5568,110 @@
           </a:prstGeom>
         </p:spPr>
       </p:pic>
+      <p:sp>
+        <p:nvSpPr>
+          <p:cNvPr id="8" name="Rectangle 7">
+            <a:extLst>
+              <a:ext uri="{FF2B5EF4-FFF2-40B4-BE49-F238E27FC236}">
+                <a16:creationId xmlns:a16="http://schemas.microsoft.com/office/drawing/2014/main" id="{397E603B-1DF3-96AE-0832-72F45C9D46CA}"/>
+              </a:ext>
+            </a:extLst>
+          </p:cNvPr>
+          <p:cNvSpPr/>
+          <p:nvPr/>
+        </p:nvSpPr>
+        <p:spPr>
+          <a:xfrm rot="2069874">
+            <a:off x="8345183" y="1104674"/>
+            <a:ext cx="6056662" cy="110239"/>
+          </a:xfrm>
+          <a:prstGeom prst="rect">
+            <a:avLst/>
+          </a:prstGeom>
+          <a:solidFill>
+            <a:srgbClr val="F6F4E6"/>
+          </a:solidFill>
+          <a:ln>
+            <a:noFill/>
+          </a:ln>
+        </p:spPr>
+        <p:style>
+          <a:lnRef idx="2">
+            <a:schemeClr val="accent1">
+              <a:shade val="50000"/>
+            </a:schemeClr>
+          </a:lnRef>
+          <a:fillRef idx="1">
+            <a:schemeClr val="accent1"/>
+          </a:fillRef>
+          <a:effectRef idx="0">
+            <a:schemeClr val="accent1"/>
+          </a:effectRef>
+          <a:fontRef idx="minor">
+            <a:schemeClr val="lt1"/>
+          </a:fontRef>
+        </p:style>
+        <p:txBody>
+          <a:bodyPr rtlCol="0" anchor="ctr"/>
+          <a:lstStyle/>
+          <a:p>
+            <a:pPr algn="ctr"/>
+            <a:endParaRPr lang="id-ID"/>
+          </a:p>
+        </p:txBody>
+      </p:sp>
+      <p:sp>
+        <p:nvSpPr>
+          <p:cNvPr id="9" name="Rectangle 8">
+            <a:extLst>
+              <a:ext uri="{FF2B5EF4-FFF2-40B4-BE49-F238E27FC236}">
+                <a16:creationId xmlns:a16="http://schemas.microsoft.com/office/drawing/2014/main" id="{0C18897A-775A-F404-DFFC-2F1BD6FB71A0}"/>
+              </a:ext>
+            </a:extLst>
+          </p:cNvPr>
+          <p:cNvSpPr/>
+          <p:nvPr/>
+        </p:nvSpPr>
+        <p:spPr>
+          <a:xfrm rot="2069874">
+            <a:off x="8534740" y="1042284"/>
+            <a:ext cx="7314519" cy="432768"/>
+          </a:xfrm>
+          <a:prstGeom prst="rect">
+            <a:avLst/>
+          </a:prstGeom>
+          <a:solidFill>
+            <a:srgbClr val="F6F4E6"/>
+          </a:solidFill>
+          <a:ln>
+            <a:noFill/>
+          </a:ln>
+        </p:spPr>
+        <p:style>
+          <a:lnRef idx="2">
+            <a:schemeClr val="accent1">
+              <a:shade val="50000"/>
+            </a:schemeClr>
+          </a:lnRef>
+          <a:fillRef idx="1">
+            <a:schemeClr val="accent1"/>
+          </a:fillRef>
+          <a:effectRef idx="0">
+            <a:schemeClr val="accent1"/>
+          </a:effectRef>
+          <a:fontRef idx="minor">
+            <a:schemeClr val="lt1"/>
+          </a:fontRef>
+        </p:style>
+        <p:txBody>
+          <a:bodyPr rtlCol="0" anchor="ctr"/>
+          <a:lstStyle/>
+          <a:p>
+            <a:pPr algn="ctr"/>
+            <a:endParaRPr lang="id-ID"/>
+          </a:p>
+        </p:txBody>
+      </p:sp>
     </p:spTree>
     <p:extLst>
       <p:ext uri="{BB962C8B-B14F-4D97-AF65-F5344CB8AC3E}">
@@ -6044,7 +5913,7 @@
                   <a:srgbClr val="F58F7C"/>
                 </a:solidFill>
               </a:rPr>
-              <a:t>maupun</a:t>
+              <a:t>informasi</a:t>
             </a:r>
             <a:r>
               <a:rPr lang="en-US" dirty="0">
@@ -6060,6 +5929,22 @@
                   <a:srgbClr val="F58F7C"/>
                 </a:solidFill>
               </a:rPr>
+              <a:t>atau</a:t>
+            </a:r>
+            <a:r>
+              <a:rPr lang="en-US" dirty="0">
+                <a:solidFill>
+                  <a:srgbClr val="F58F7C"/>
+                </a:solidFill>
+              </a:rPr>
+              <a:t> </a:t>
+            </a:r>
+            <a:r>
+              <a:rPr lang="en-US" dirty="0" err="1">
+                <a:solidFill>
+                  <a:srgbClr val="F58F7C"/>
+                </a:solidFill>
+              </a:rPr>
               <a:t>membeli</a:t>
             </a:r>
             <a:r>
@@ -6069,22 +5954,6 @@
                 </a:solidFill>
               </a:rPr>
               <a:t> laptop/notebook </a:t>
-            </a:r>
-            <a:r>
-              <a:rPr lang="en-US" dirty="0" err="1">
-                <a:solidFill>
-                  <a:srgbClr val="F58F7C"/>
-                </a:solidFill>
-              </a:rPr>
-              <a:t>dimanapun</a:t>
-            </a:r>
-            <a:r>
-              <a:rPr lang="en-US" dirty="0">
-                <a:solidFill>
-                  <a:srgbClr val="F58F7C"/>
-                </a:solidFill>
-              </a:rPr>
-              <a:t> </a:t>
             </a:r>
             <a:r>
               <a:rPr lang="en-US" dirty="0" err="1">
@@ -6200,6 +6069,162 @@
           </a:prstGeom>
         </p:spPr>
       </p:pic>
+      <p:sp>
+        <p:nvSpPr>
+          <p:cNvPr id="2" name="Oval 1">
+            <a:extLst>
+              <a:ext uri="{FF2B5EF4-FFF2-40B4-BE49-F238E27FC236}">
+                <a16:creationId xmlns:a16="http://schemas.microsoft.com/office/drawing/2014/main" id="{170FC51E-A892-EDB0-2D30-833788B23B13}"/>
+              </a:ext>
+            </a:extLst>
+          </p:cNvPr>
+          <p:cNvSpPr/>
+          <p:nvPr/>
+        </p:nvSpPr>
+        <p:spPr>
+          <a:xfrm>
+            <a:off x="8833501" y="5448609"/>
+            <a:ext cx="5355391" cy="5355391"/>
+          </a:xfrm>
+          <a:prstGeom prst="ellipse">
+            <a:avLst/>
+          </a:prstGeom>
+          <a:solidFill>
+            <a:srgbClr val="F6F4E6"/>
+          </a:solidFill>
+          <a:ln>
+            <a:noFill/>
+          </a:ln>
+        </p:spPr>
+        <p:style>
+          <a:lnRef idx="2">
+            <a:schemeClr val="accent1">
+              <a:shade val="50000"/>
+            </a:schemeClr>
+          </a:lnRef>
+          <a:fillRef idx="1">
+            <a:schemeClr val="accent1"/>
+          </a:fillRef>
+          <a:effectRef idx="0">
+            <a:schemeClr val="accent1"/>
+          </a:effectRef>
+          <a:fontRef idx="minor">
+            <a:schemeClr val="lt1"/>
+          </a:fontRef>
+        </p:style>
+        <p:txBody>
+          <a:bodyPr rtlCol="0" anchor="ctr"/>
+          <a:lstStyle/>
+          <a:p>
+            <a:pPr algn="ctr"/>
+            <a:endParaRPr lang="id-ID"/>
+          </a:p>
+        </p:txBody>
+      </p:sp>
+      <p:sp>
+        <p:nvSpPr>
+          <p:cNvPr id="11" name="Oval 10">
+            <a:extLst>
+              <a:ext uri="{FF2B5EF4-FFF2-40B4-BE49-F238E27FC236}">
+                <a16:creationId xmlns:a16="http://schemas.microsoft.com/office/drawing/2014/main" id="{71896E33-E386-0AD7-9A8A-F8E1B10DAB71}"/>
+              </a:ext>
+            </a:extLst>
+          </p:cNvPr>
+          <p:cNvSpPr/>
+          <p:nvPr/>
+        </p:nvSpPr>
+        <p:spPr>
+          <a:xfrm>
+            <a:off x="-2235900" y="-2850981"/>
+            <a:ext cx="3720019" cy="3720019"/>
+          </a:xfrm>
+          <a:prstGeom prst="ellipse">
+            <a:avLst/>
+          </a:prstGeom>
+          <a:solidFill>
+            <a:srgbClr val="F6F4E6"/>
+          </a:solidFill>
+          <a:ln>
+            <a:noFill/>
+          </a:ln>
+        </p:spPr>
+        <p:style>
+          <a:lnRef idx="2">
+            <a:schemeClr val="accent1">
+              <a:shade val="50000"/>
+            </a:schemeClr>
+          </a:lnRef>
+          <a:fillRef idx="1">
+            <a:schemeClr val="accent1"/>
+          </a:fillRef>
+          <a:effectRef idx="0">
+            <a:schemeClr val="accent1"/>
+          </a:effectRef>
+          <a:fontRef idx="minor">
+            <a:schemeClr val="lt1"/>
+          </a:fontRef>
+        </p:style>
+        <p:txBody>
+          <a:bodyPr rtlCol="0" anchor="ctr"/>
+          <a:lstStyle/>
+          <a:p>
+            <a:pPr algn="ctr"/>
+            <a:endParaRPr lang="id-ID"/>
+          </a:p>
+        </p:txBody>
+      </p:sp>
+      <p:sp>
+        <p:nvSpPr>
+          <p:cNvPr id="12" name="Oval 11">
+            <a:extLst>
+              <a:ext uri="{FF2B5EF4-FFF2-40B4-BE49-F238E27FC236}">
+                <a16:creationId xmlns:a16="http://schemas.microsoft.com/office/drawing/2014/main" id="{BEE33FA0-3A07-FBEC-8346-91C853BB9AAA}"/>
+              </a:ext>
+            </a:extLst>
+          </p:cNvPr>
+          <p:cNvSpPr/>
+          <p:nvPr/>
+        </p:nvSpPr>
+        <p:spPr>
+          <a:xfrm>
+            <a:off x="11511196" y="4960417"/>
+            <a:ext cx="1386382" cy="1386382"/>
+          </a:xfrm>
+          <a:prstGeom prst="ellipse">
+            <a:avLst/>
+          </a:prstGeom>
+          <a:solidFill>
+            <a:srgbClr val="F6F4E6"/>
+          </a:solidFill>
+          <a:ln>
+            <a:noFill/>
+          </a:ln>
+        </p:spPr>
+        <p:style>
+          <a:lnRef idx="2">
+            <a:schemeClr val="accent1">
+              <a:shade val="50000"/>
+            </a:schemeClr>
+          </a:lnRef>
+          <a:fillRef idx="1">
+            <a:schemeClr val="accent1"/>
+          </a:fillRef>
+          <a:effectRef idx="0">
+            <a:schemeClr val="accent1"/>
+          </a:effectRef>
+          <a:fontRef idx="minor">
+            <a:schemeClr val="lt1"/>
+          </a:fontRef>
+        </p:style>
+        <p:txBody>
+          <a:bodyPr rtlCol="0" anchor="ctr"/>
+          <a:lstStyle/>
+          <a:p>
+            <a:pPr algn="ctr"/>
+            <a:endParaRPr lang="id-ID"/>
+          </a:p>
+        </p:txBody>
+      </p:sp>
     </p:spTree>
     <p:extLst>
       <p:ext uri="{BB962C8B-B14F-4D97-AF65-F5344CB8AC3E}">
@@ -6350,6 +6375,157 @@
           <a:prstGeom prst="rect">
             <a:avLst/>
           </a:prstGeom>
+        </p:spPr>
+      </p:pic>
+      <p:sp>
+        <p:nvSpPr>
+          <p:cNvPr id="12" name="Rectangle 11">
+            <a:extLst>
+              <a:ext uri="{FF2B5EF4-FFF2-40B4-BE49-F238E27FC236}">
+                <a16:creationId xmlns:a16="http://schemas.microsoft.com/office/drawing/2014/main" id="{21E35751-0894-8A00-914A-C6EE9FE4D313}"/>
+              </a:ext>
+            </a:extLst>
+          </p:cNvPr>
+          <p:cNvSpPr/>
+          <p:nvPr/>
+        </p:nvSpPr>
+        <p:spPr>
+          <a:xfrm>
+            <a:off x="11786532" y="-75501"/>
+            <a:ext cx="478173" cy="7013196"/>
+          </a:xfrm>
+          <a:prstGeom prst="rect">
+            <a:avLst/>
+          </a:prstGeom>
+          <a:solidFill>
+            <a:srgbClr val="F6F4E6"/>
+          </a:solidFill>
+          <a:ln>
+            <a:noFill/>
+          </a:ln>
+        </p:spPr>
+        <p:style>
+          <a:lnRef idx="2">
+            <a:schemeClr val="accent1">
+              <a:shade val="50000"/>
+            </a:schemeClr>
+          </a:lnRef>
+          <a:fillRef idx="1">
+            <a:schemeClr val="accent1"/>
+          </a:fillRef>
+          <a:effectRef idx="0">
+            <a:schemeClr val="accent1"/>
+          </a:effectRef>
+          <a:fontRef idx="minor">
+            <a:schemeClr val="lt1"/>
+          </a:fontRef>
+        </p:style>
+        <p:txBody>
+          <a:bodyPr rtlCol="0" anchor="ctr"/>
+          <a:lstStyle/>
+          <a:p>
+            <a:pPr algn="ctr"/>
+            <a:endParaRPr lang="id-ID"/>
+          </a:p>
+        </p:txBody>
+      </p:sp>
+      <p:sp>
+        <p:nvSpPr>
+          <p:cNvPr id="14" name="Rectangle 13">
+            <a:extLst>
+              <a:ext uri="{FF2B5EF4-FFF2-40B4-BE49-F238E27FC236}">
+                <a16:creationId xmlns:a16="http://schemas.microsoft.com/office/drawing/2014/main" id="{6EAE05DD-CF97-5ECF-59B1-9972A2A2A6AA}"/>
+              </a:ext>
+            </a:extLst>
+          </p:cNvPr>
+          <p:cNvSpPr/>
+          <p:nvPr/>
+        </p:nvSpPr>
+        <p:spPr>
+          <a:xfrm rot="2700000">
+            <a:off x="-1187199" y="5960476"/>
+            <a:ext cx="2683566" cy="1706160"/>
+          </a:xfrm>
+          <a:prstGeom prst="rect">
+            <a:avLst/>
+          </a:prstGeom>
+          <a:solidFill>
+            <a:srgbClr val="F6F4E6"/>
+          </a:solidFill>
+          <a:ln>
+            <a:noFill/>
+          </a:ln>
+        </p:spPr>
+        <p:style>
+          <a:lnRef idx="2">
+            <a:schemeClr val="accent1">
+              <a:shade val="50000"/>
+            </a:schemeClr>
+          </a:lnRef>
+          <a:fillRef idx="1">
+            <a:schemeClr val="accent1"/>
+          </a:fillRef>
+          <a:effectRef idx="0">
+            <a:schemeClr val="accent1"/>
+          </a:effectRef>
+          <a:fontRef idx="minor">
+            <a:schemeClr val="lt1"/>
+          </a:fontRef>
+        </p:style>
+        <p:txBody>
+          <a:bodyPr rtlCol="0" anchor="ctr"/>
+          <a:lstStyle/>
+          <a:p>
+            <a:pPr algn="ctr"/>
+            <a:endParaRPr lang="id-ID"/>
+          </a:p>
+        </p:txBody>
+      </p:sp>
+      <p:pic>
+        <p:nvPicPr>
+          <p:cNvPr id="1026" name="Picture 2">
+            <a:extLst>
+              <a:ext uri="{FF2B5EF4-FFF2-40B4-BE49-F238E27FC236}">
+                <a16:creationId xmlns:a16="http://schemas.microsoft.com/office/drawing/2014/main" id="{E8FAE77F-64A1-AB02-0DFD-D66B9849B16B}"/>
+              </a:ext>
+            </a:extLst>
+          </p:cNvPr>
+          <p:cNvPicPr>
+            <a:picLocks noChangeAspect="1" noChangeArrowheads="1"/>
+          </p:cNvPicPr>
+          <p:nvPr/>
+        </p:nvPicPr>
+        <p:blipFill>
+          <a:blip r:embed="rId3">
+            <a:extLst>
+              <a:ext uri="{28A0092B-C50C-407E-A947-70E740481C1C}">
+                <a14:useLocalDpi xmlns:a14="http://schemas.microsoft.com/office/drawing/2010/main" val="0"/>
+              </a:ext>
+            </a:extLst>
+          </a:blip>
+          <a:srcRect/>
+          <a:stretch>
+            <a:fillRect/>
+          </a:stretch>
+        </p:blipFill>
+        <p:spPr bwMode="auto">
+          <a:xfrm>
+            <a:off x="8964450" y="4357533"/>
+            <a:ext cx="2322527" cy="2322527"/>
+          </a:xfrm>
+          <a:prstGeom prst="rect">
+            <a:avLst/>
+          </a:prstGeom>
+          <a:noFill/>
+          <a:extLst>
+            <a:ext uri="{909E8E84-426E-40DD-AFC4-6F175D3DCCD1}">
+              <a14:hiddenFill xmlns:a14="http://schemas.microsoft.com/office/drawing/2010/main">
+                <a:solidFill>
+                  <a:srgbClr val="FFFFFF"/>
+                </a:solidFill>
+              </a14:hiddenFill>
+            </a:ext>
+          </a:extLst>
         </p:spPr>
       </p:pic>
     </p:spTree>
@@ -8543,14 +8719,14 @@
             <p:ph idx="1"/>
             <p:extLst>
               <p:ext uri="{D42A27DB-BD31-4B8C-83A1-F6EECF244321}">
-                <p14:modId xmlns:p14="http://schemas.microsoft.com/office/powerpoint/2010/main" val="3639404345"/>
+                <p14:modId xmlns:p14="http://schemas.microsoft.com/office/powerpoint/2010/main" val="3181128126"/>
               </p:ext>
             </p:extLst>
           </p:nvPr>
         </p:nvGraphicFramePr>
         <p:xfrm>
-          <a:off x="838200" y="2497264"/>
-          <a:ext cx="10515600" cy="2606040"/>
+          <a:off x="838200" y="2921184"/>
+          <a:ext cx="10515600" cy="2636520"/>
         </p:xfrm>
         <a:graphic>
           <a:graphicData uri="http://schemas.openxmlformats.org/drawingml/2006/table">
@@ -9227,15 +9403,42 @@
                         </a:spcAft>
                       </a:pPr>
                       <a:r>
-                        <a:rPr lang="id-ID" sz="1600" b="0" u="none" strike="noStrike">
+                        <a:rPr lang="id-ID" sz="1600" b="0" u="none" strike="noStrike" dirty="0">
                           <a:solidFill>
                             <a:srgbClr val="000000"/>
                           </a:solidFill>
                           <a:effectLst/>
                         </a:rPr>
-                        <a:t>Mengubah data user</a:t>
-                      </a:r>
-                      <a:endParaRPr lang="id-ID">
+                        <a:t>Mengubah data </a:t>
+                      </a:r>
+                      <a:r>
+                        <a:rPr lang="id-ID" sz="1600" b="0" u="none" strike="noStrike" dirty="0" err="1">
+                          <a:solidFill>
+                            <a:srgbClr val="000000"/>
+                          </a:solidFill>
+                          <a:effectLst/>
+                        </a:rPr>
+                        <a:t>user</a:t>
+                      </a:r>
+                      <a:r>
+                        <a:rPr lang="en-US" sz="1600" b="0" u="none" strike="noStrike" dirty="0">
+                          <a:solidFill>
+                            <a:srgbClr val="000000"/>
+                          </a:solidFill>
+                          <a:effectLst/>
+                        </a:rPr>
+                        <a:t> </a:t>
+                      </a:r>
+                      <a:r>
+                        <a:rPr lang="sv-SE" sz="1800" b="0" u="none" strike="noStrike" dirty="0">
+                          <a:solidFill>
+                            <a:srgbClr val="000000"/>
+                          </a:solidFill>
+                          <a:effectLst/>
+                        </a:rPr>
+                        <a:t>berdasarkan access token</a:t>
+                      </a:r>
+                      <a:endParaRPr lang="id-ID" dirty="0">
                         <a:effectLst/>
                       </a:endParaRPr>
                     </a:p>
@@ -9356,7 +9559,7 @@
                           </a:solidFill>
                           <a:effectLst/>
                         </a:rPr>
-                        <a:t>Menampilkan informasi user berdasarkan acces token</a:t>
+                        <a:t>Menampilkan informasi user berdasarkan access token</a:t>
                       </a:r>
                       <a:endParaRPr lang="sv-SE" dirty="0">
                         <a:effectLst/>
@@ -9391,7 +9594,7 @@
         </p:nvSpPr>
         <p:spPr>
           <a:xfrm>
-            <a:off x="838200" y="1108244"/>
+            <a:off x="838200" y="1809000"/>
             <a:ext cx="10515600" cy="1325563"/>
           </a:xfrm>
           <a:prstGeom prst="rect">
@@ -9512,13 +9715,169 @@
                   <a:srgbClr val="F58F7C"/>
                 </a:solidFill>
               </a:rPr>
-              <a:t>Restful API</a:t>
+              <a:t>BACKEND</a:t>
             </a:r>
             <a:endParaRPr lang="id-ID" dirty="0">
               <a:solidFill>
                 <a:srgbClr val="F58F7C"/>
               </a:solidFill>
             </a:endParaRPr>
+          </a:p>
+        </p:txBody>
+      </p:sp>
+      <p:sp>
+        <p:nvSpPr>
+          <p:cNvPr id="7" name="Rectangle 6">
+            <a:extLst>
+              <a:ext uri="{FF2B5EF4-FFF2-40B4-BE49-F238E27FC236}">
+                <a16:creationId xmlns:a16="http://schemas.microsoft.com/office/drawing/2014/main" id="{8E24D1F3-2147-3A32-16AD-A01A98A6F360}"/>
+              </a:ext>
+            </a:extLst>
+          </p:cNvPr>
+          <p:cNvSpPr/>
+          <p:nvPr/>
+        </p:nvSpPr>
+        <p:spPr>
+          <a:xfrm>
+            <a:off x="399647" y="1330776"/>
+            <a:ext cx="2505923" cy="86963"/>
+          </a:xfrm>
+          <a:prstGeom prst="rect">
+            <a:avLst/>
+          </a:prstGeom>
+          <a:solidFill>
+            <a:srgbClr val="F6F4E6"/>
+          </a:solidFill>
+          <a:ln>
+            <a:noFill/>
+          </a:ln>
+        </p:spPr>
+        <p:style>
+          <a:lnRef idx="2">
+            <a:schemeClr val="accent1">
+              <a:shade val="50000"/>
+            </a:schemeClr>
+          </a:lnRef>
+          <a:fillRef idx="1">
+            <a:schemeClr val="accent1"/>
+          </a:fillRef>
+          <a:effectRef idx="0">
+            <a:schemeClr val="accent1"/>
+          </a:effectRef>
+          <a:fontRef idx="minor">
+            <a:schemeClr val="lt1"/>
+          </a:fontRef>
+        </p:style>
+        <p:txBody>
+          <a:bodyPr rtlCol="0" anchor="ctr"/>
+          <a:lstStyle/>
+          <a:p>
+            <a:pPr algn="ctr"/>
+            <a:endParaRPr lang="id-ID"/>
+          </a:p>
+        </p:txBody>
+      </p:sp>
+      <p:sp>
+        <p:nvSpPr>
+          <p:cNvPr id="8" name="Oval 7">
+            <a:extLst>
+              <a:ext uri="{FF2B5EF4-FFF2-40B4-BE49-F238E27FC236}">
+                <a16:creationId xmlns:a16="http://schemas.microsoft.com/office/drawing/2014/main" id="{6D590428-1FE5-20E9-3B7C-DC4FB77ECB77}"/>
+              </a:ext>
+            </a:extLst>
+          </p:cNvPr>
+          <p:cNvSpPr/>
+          <p:nvPr/>
+        </p:nvSpPr>
+        <p:spPr>
+          <a:xfrm>
+            <a:off x="9932343" y="-2389243"/>
+            <a:ext cx="3720019" cy="3720019"/>
+          </a:xfrm>
+          <a:prstGeom prst="ellipse">
+            <a:avLst/>
+          </a:prstGeom>
+          <a:solidFill>
+            <a:srgbClr val="F6F4E6"/>
+          </a:solidFill>
+          <a:ln>
+            <a:noFill/>
+          </a:ln>
+        </p:spPr>
+        <p:style>
+          <a:lnRef idx="2">
+            <a:schemeClr val="accent1">
+              <a:shade val="50000"/>
+            </a:schemeClr>
+          </a:lnRef>
+          <a:fillRef idx="1">
+            <a:schemeClr val="accent1"/>
+          </a:fillRef>
+          <a:effectRef idx="0">
+            <a:schemeClr val="accent1"/>
+          </a:effectRef>
+          <a:fontRef idx="minor">
+            <a:schemeClr val="lt1"/>
+          </a:fontRef>
+        </p:style>
+        <p:txBody>
+          <a:bodyPr rtlCol="0" anchor="ctr"/>
+          <a:lstStyle/>
+          <a:p>
+            <a:pPr algn="ctr"/>
+            <a:endParaRPr lang="id-ID"/>
+          </a:p>
+        </p:txBody>
+      </p:sp>
+      <p:sp>
+        <p:nvSpPr>
+          <p:cNvPr id="9" name="Oval 8">
+            <a:extLst>
+              <a:ext uri="{FF2B5EF4-FFF2-40B4-BE49-F238E27FC236}">
+                <a16:creationId xmlns:a16="http://schemas.microsoft.com/office/drawing/2014/main" id="{D7665A83-D4E4-73FA-A89B-2B38FA9C903C}"/>
+              </a:ext>
+            </a:extLst>
+          </p:cNvPr>
+          <p:cNvSpPr/>
+          <p:nvPr/>
+        </p:nvSpPr>
+        <p:spPr>
+          <a:xfrm>
+            <a:off x="10041818" y="-2279768"/>
+            <a:ext cx="3501067" cy="3501067"/>
+          </a:xfrm>
+          <a:prstGeom prst="ellipse">
+            <a:avLst/>
+          </a:prstGeom>
+          <a:noFill/>
+          <a:ln w="76200">
+            <a:solidFill>
+              <a:srgbClr val="2E3037"/>
+            </a:solidFill>
+          </a:ln>
+        </p:spPr>
+        <p:style>
+          <a:lnRef idx="2">
+            <a:schemeClr val="accent1">
+              <a:shade val="50000"/>
+            </a:schemeClr>
+          </a:lnRef>
+          <a:fillRef idx="1">
+            <a:schemeClr val="accent1"/>
+          </a:fillRef>
+          <a:effectRef idx="0">
+            <a:schemeClr val="accent1"/>
+          </a:effectRef>
+          <a:fontRef idx="minor">
+            <a:schemeClr val="lt1"/>
+          </a:fontRef>
+        </p:style>
+        <p:txBody>
+          <a:bodyPr rtlCol="0" anchor="ctr"/>
+          <a:lstStyle/>
+          <a:p>
+            <a:pPr algn="ctr"/>
+            <a:endParaRPr lang="id-ID"/>
           </a:p>
         </p:txBody>
       </p:sp>
@@ -9677,14 +10036,14 @@
             <p:ph idx="1"/>
             <p:extLst>
               <p:ext uri="{D42A27DB-BD31-4B8C-83A1-F6EECF244321}">
-                <p14:modId xmlns:p14="http://schemas.microsoft.com/office/powerpoint/2010/main" val="2841215496"/>
+                <p14:modId xmlns:p14="http://schemas.microsoft.com/office/powerpoint/2010/main" val="3957082645"/>
               </p:ext>
             </p:extLst>
           </p:nvPr>
         </p:nvGraphicFramePr>
         <p:xfrm>
           <a:off x="838200" y="1825625"/>
-          <a:ext cx="10515600" cy="2108200"/>
+          <a:ext cx="10515600" cy="2138680"/>
         </p:xfrm>
         <a:graphic>
           <a:graphicData uri="http://schemas.openxmlformats.org/drawingml/2006/table">
@@ -9707,14 +10066,14 @@
                     </a:ext>
                   </a:extLst>
                 </a:gridCol>
-                <a:gridCol w="4021741">
+                <a:gridCol w="4437460">
                   <a:extLst>
                     <a:ext uri="{9D8B030D-6E8A-4147-A177-3AD203B41FA5}">
                       <a16:colId xmlns:a16="http://schemas.microsoft.com/office/drawing/2014/main" val="3633351604"/>
                     </a:ext>
                   </a:extLst>
                 </a:gridCol>
-                <a:gridCol w="4702147">
+                <a:gridCol w="4286428">
                   <a:extLst>
                     <a:ext uri="{9D8B030D-6E8A-4147-A177-3AD203B41FA5}">
                       <a16:colId xmlns:a16="http://schemas.microsoft.com/office/drawing/2014/main" val="3975719372"/>
@@ -9903,7 +10262,7 @@
                         </a:spcAft>
                       </a:pPr>
                       <a:r>
-                        <a:rPr lang="id-ID" sz="1600" b="1" u="none" strike="noStrike" dirty="0">
+                        <a:rPr lang="id-ID" sz="1400" b="1" u="none" strike="noStrike" dirty="0">
                           <a:solidFill>
                             <a:srgbClr val="000000"/>
                           </a:solidFill>
@@ -9914,7 +10273,7 @@
                         <a:t>localhost:3000/</a:t>
                       </a:r>
                       <a:r>
-                        <a:rPr lang="id-ID" sz="1600" b="1" u="none" strike="noStrike" dirty="0" err="1">
+                        <a:rPr lang="id-ID" sz="1400" b="1" u="none" strike="noStrike" dirty="0" err="1">
                           <a:solidFill>
                             <a:srgbClr val="000000"/>
                           </a:solidFill>
@@ -9924,7 +10283,7 @@
                         </a:rPr>
                         <a:t>products</a:t>
                       </a:r>
-                      <a:endParaRPr lang="id-ID" dirty="0">
+                      <a:endParaRPr lang="id-ID" sz="1400" dirty="0">
                         <a:effectLst/>
                         <a:latin typeface="Courier New" panose="02070309020205020404" pitchFamily="49" charset="0"/>
                         <a:cs typeface="Courier New" panose="02070309020205020404" pitchFamily="49" charset="0"/>
@@ -10046,7 +10405,7 @@
                         </a:spcAft>
                       </a:pPr>
                       <a:r>
-                        <a:rPr lang="id-ID" sz="1600" b="1" u="none" strike="noStrike" dirty="0">
+                        <a:rPr lang="id-ID" sz="1400" b="1" u="none" strike="noStrike" dirty="0">
                           <a:solidFill>
                             <a:srgbClr val="0F0C0D"/>
                           </a:solidFill>
@@ -10057,7 +10416,7 @@
                         <a:t>localhost:3000/</a:t>
                       </a:r>
                       <a:r>
-                        <a:rPr lang="id-ID" sz="1600" b="1" u="none" strike="noStrike" dirty="0" err="1">
+                        <a:rPr lang="id-ID" sz="1400" b="1" u="none" strike="noStrike" dirty="0" err="1">
                           <a:solidFill>
                             <a:srgbClr val="0F0C0D"/>
                           </a:solidFill>
@@ -10067,7 +10426,7 @@
                         </a:rPr>
                         <a:t>products</a:t>
                       </a:r>
-                      <a:endParaRPr lang="id-ID" dirty="0">
+                      <a:endParaRPr lang="id-ID" sz="1400" dirty="0">
                         <a:effectLst/>
                         <a:latin typeface="Courier New" panose="02070309020205020404" pitchFamily="49" charset="0"/>
                         <a:cs typeface="Courier New" panose="02070309020205020404" pitchFamily="49" charset="0"/>
@@ -10196,7 +10555,7 @@
                         </a:spcAft>
                       </a:pPr>
                       <a:r>
-                        <a:rPr lang="id-ID" sz="1600" b="1" u="none" strike="noStrike" dirty="0">
+                        <a:rPr lang="id-ID" sz="1400" b="1" u="none" strike="noStrike" dirty="0">
                           <a:solidFill>
                             <a:srgbClr val="0F0C0D"/>
                           </a:solidFill>
@@ -10207,7 +10566,7 @@
                         <a:t>localhost:3000/</a:t>
                       </a:r>
                       <a:r>
-                        <a:rPr lang="id-ID" sz="1600" b="1" u="none" strike="noStrike" dirty="0" err="1">
+                        <a:rPr lang="id-ID" sz="1400" b="1" u="none" strike="noStrike" dirty="0" err="1">
                           <a:solidFill>
                             <a:srgbClr val="0F0C0D"/>
                           </a:solidFill>
@@ -10218,7 +10577,7 @@
                         <a:t>products</a:t>
                       </a:r>
                       <a:r>
-                        <a:rPr lang="id-ID" sz="1600" b="1" u="none" strike="noStrike" dirty="0">
+                        <a:rPr lang="id-ID" sz="1400" b="1" u="none" strike="noStrike" dirty="0">
                           <a:solidFill>
                             <a:srgbClr val="0F0C0D"/>
                           </a:solidFill>
@@ -10229,7 +10588,7 @@
                         <a:t>/:</a:t>
                       </a:r>
                       <a:r>
-                        <a:rPr lang="id-ID" sz="1600" b="1" u="none" strike="noStrike" dirty="0" err="1">
+                        <a:rPr lang="id-ID" sz="1400" b="1" u="none" strike="noStrike" dirty="0" err="1">
                           <a:solidFill>
                             <a:srgbClr val="0F0C0D"/>
                           </a:solidFill>
@@ -10239,7 +10598,18 @@
                         </a:rPr>
                         <a:t>id</a:t>
                       </a:r>
-                      <a:endParaRPr lang="id-ID" dirty="0">
+                      <a:r>
+                        <a:rPr lang="en-US" sz="1400" b="1" u="none" strike="noStrike" dirty="0">
+                          <a:solidFill>
+                            <a:srgbClr val="0F0C0D"/>
+                          </a:solidFill>
+                          <a:effectLst/>
+                          <a:latin typeface="Courier New" panose="02070309020205020404" pitchFamily="49" charset="0"/>
+                          <a:cs typeface="Courier New" panose="02070309020205020404" pitchFamily="49" charset="0"/>
+                        </a:rPr>
+                        <a:t>_product</a:t>
+                      </a:r>
+                      <a:endParaRPr lang="id-ID" sz="1400" dirty="0">
                         <a:effectLst/>
                         <a:latin typeface="Courier New" panose="02070309020205020404" pitchFamily="49" charset="0"/>
                         <a:cs typeface="Courier New" panose="02070309020205020404" pitchFamily="49" charset="0"/>
@@ -10269,6 +10639,24 @@
                           <a:effectLst/>
                         </a:rPr>
                         <a:t>Mengubah data produk </a:t>
+                      </a:r>
+                      <a:r>
+                        <a:rPr lang="id-ID" sz="1800" b="0" u="none" strike="noStrike" dirty="0">
+                          <a:solidFill>
+                            <a:srgbClr val="000000"/>
+                          </a:solidFill>
+                          <a:effectLst/>
+                        </a:rPr>
+                        <a:t>berdasarkan </a:t>
+                      </a:r>
+                      <a:r>
+                        <a:rPr lang="id-ID" sz="1800" b="0" u="none" strike="noStrike" dirty="0" err="1">
+                          <a:solidFill>
+                            <a:srgbClr val="000000"/>
+                          </a:solidFill>
+                          <a:effectLst/>
+                        </a:rPr>
+                        <a:t>id</a:t>
                       </a:r>
                       <a:endParaRPr lang="id-ID" dirty="0">
                         <a:effectLst/>
@@ -10341,7 +10729,7 @@
                         </a:spcAft>
                       </a:pPr>
                       <a:r>
-                        <a:rPr lang="id-ID" sz="1600" b="1" u="none" strike="noStrike" dirty="0">
+                        <a:rPr lang="id-ID" sz="1400" b="1" u="none" strike="noStrike" dirty="0">
                           <a:solidFill>
                             <a:srgbClr val="0F0C0D"/>
                           </a:solidFill>
@@ -10352,7 +10740,7 @@
                         <a:t>localhost:3000/</a:t>
                       </a:r>
                       <a:r>
-                        <a:rPr lang="id-ID" sz="1600" b="1" u="none" strike="noStrike" dirty="0" err="1">
+                        <a:rPr lang="id-ID" sz="1400" b="1" u="none" strike="noStrike" dirty="0" err="1">
                           <a:solidFill>
                             <a:srgbClr val="0F0C0D"/>
                           </a:solidFill>
@@ -10363,7 +10751,7 @@
                         <a:t>products</a:t>
                       </a:r>
                       <a:r>
-                        <a:rPr lang="id-ID" sz="1600" b="1" u="none" strike="noStrike" dirty="0">
+                        <a:rPr lang="id-ID" sz="1400" b="1" u="none" strike="noStrike" dirty="0">
                           <a:solidFill>
                             <a:srgbClr val="0F0C0D"/>
                           </a:solidFill>
@@ -10374,7 +10762,7 @@
                         <a:t>/:</a:t>
                       </a:r>
                       <a:r>
-                        <a:rPr lang="id-ID" sz="1600" b="1" u="none" strike="noStrike" dirty="0" err="1">
+                        <a:rPr lang="id-ID" sz="1400" b="1" u="none" strike="noStrike" dirty="0" err="1">
                           <a:solidFill>
                             <a:srgbClr val="0F0C0D"/>
                           </a:solidFill>
@@ -10384,7 +10772,18 @@
                         </a:rPr>
                         <a:t>id</a:t>
                       </a:r>
-                      <a:endParaRPr lang="id-ID" dirty="0">
+                      <a:r>
+                        <a:rPr lang="en-US" sz="1400" b="1" u="none" strike="noStrike" dirty="0">
+                          <a:solidFill>
+                            <a:srgbClr val="0F0C0D"/>
+                          </a:solidFill>
+                          <a:effectLst/>
+                          <a:latin typeface="Courier New" panose="02070309020205020404" pitchFamily="49" charset="0"/>
+                          <a:cs typeface="Courier New" panose="02070309020205020404" pitchFamily="49" charset="0"/>
+                        </a:rPr>
+                        <a:t>_product</a:t>
+                      </a:r>
+                      <a:endParaRPr lang="id-ID" sz="1400" dirty="0">
                         <a:effectLst/>
                         <a:latin typeface="Courier New" panose="02070309020205020404" pitchFamily="49" charset="0"/>
                         <a:cs typeface="Courier New" panose="02070309020205020404" pitchFamily="49" charset="0"/>
@@ -10441,6 +10840,53 @@
           </a:graphicData>
         </a:graphic>
       </p:graphicFrame>
+      <p:pic>
+        <p:nvPicPr>
+          <p:cNvPr id="2050" name="Picture 2" descr="SIMPKB Docs">
+            <a:extLst>
+              <a:ext uri="{FF2B5EF4-FFF2-40B4-BE49-F238E27FC236}">
+                <a16:creationId xmlns:a16="http://schemas.microsoft.com/office/drawing/2014/main" id="{18C7F32D-52EA-BBC4-FA14-FF1DFC9FF504}"/>
+              </a:ext>
+            </a:extLst>
+          </p:cNvPr>
+          <p:cNvPicPr>
+            <a:picLocks noChangeAspect="1" noChangeArrowheads="1"/>
+          </p:cNvPicPr>
+          <p:nvPr/>
+        </p:nvPicPr>
+        <p:blipFill>
+          <a:blip r:embed="rId2">
+            <a:extLst>
+              <a:ext uri="{28A0092B-C50C-407E-A947-70E740481C1C}">
+                <a14:useLocalDpi xmlns:a14="http://schemas.microsoft.com/office/drawing/2010/main" val="0"/>
+              </a:ext>
+            </a:extLst>
+          </a:blip>
+          <a:srcRect/>
+          <a:stretch>
+            <a:fillRect/>
+          </a:stretch>
+        </p:blipFill>
+        <p:spPr bwMode="auto">
+          <a:xfrm>
+            <a:off x="8682527" y="4674472"/>
+            <a:ext cx="2984111" cy="1739146"/>
+          </a:xfrm>
+          <a:prstGeom prst="rect">
+            <a:avLst/>
+          </a:prstGeom>
+          <a:noFill/>
+          <a:extLst>
+            <a:ext uri="{909E8E84-426E-40DD-AFC4-6F175D3DCCD1}">
+              <a14:hiddenFill xmlns:a14="http://schemas.microsoft.com/office/drawing/2010/main">
+                <a:solidFill>
+                  <a:srgbClr val="FFFFFF"/>
+                </a:solidFill>
+              </a14:hiddenFill>
+            </a:ext>
+          </a:extLst>
+        </p:spPr>
+      </p:pic>
     </p:spTree>
     <p:extLst>
       <p:ext uri="{BB962C8B-B14F-4D97-AF65-F5344CB8AC3E}">
@@ -10487,14 +10933,14 @@
             <p:ph idx="1"/>
             <p:extLst>
               <p:ext uri="{D42A27DB-BD31-4B8C-83A1-F6EECF244321}">
-                <p14:modId xmlns:p14="http://schemas.microsoft.com/office/powerpoint/2010/main" val="1423649150"/>
+                <p14:modId xmlns:p14="http://schemas.microsoft.com/office/powerpoint/2010/main" val="54048249"/>
               </p:ext>
             </p:extLst>
           </p:nvPr>
         </p:nvGraphicFramePr>
         <p:xfrm>
           <a:off x="838200" y="1825625"/>
-          <a:ext cx="10515600" cy="3030220"/>
+          <a:ext cx="10515600" cy="3487420"/>
         </p:xfrm>
         <a:graphic>
           <a:graphicData uri="http://schemas.openxmlformats.org/drawingml/2006/table">
@@ -10653,7 +11099,7 @@
                         </a:spcAft>
                       </a:pPr>
                       <a:r>
-                        <a:rPr lang="id-ID" sz="1600" b="1" u="none" strike="noStrike" dirty="0">
+                        <a:rPr lang="id-ID" sz="1400" b="1" u="none" strike="noStrike" dirty="0">
                           <a:solidFill>
                             <a:srgbClr val="000000"/>
                           </a:solidFill>
@@ -10664,7 +11110,7 @@
                         <a:t>localhost:3000/</a:t>
                       </a:r>
                       <a:r>
-                        <a:rPr lang="id-ID" sz="1600" b="1" u="none" strike="noStrike" dirty="0" err="1">
+                        <a:rPr lang="id-ID" sz="1400" b="1" u="none" strike="noStrike" dirty="0" err="1">
                           <a:solidFill>
                             <a:srgbClr val="000000"/>
                           </a:solidFill>
@@ -10675,7 +11121,7 @@
                         <a:t>carts</a:t>
                       </a:r>
                       <a:r>
-                        <a:rPr lang="en-US" sz="1600" b="1" u="none" strike="noStrike" dirty="0">
+                        <a:rPr lang="en-US" sz="1400" b="1" u="none" strike="noStrike" dirty="0">
                           <a:solidFill>
                             <a:srgbClr val="000000"/>
                           </a:solidFill>
@@ -10685,7 +11131,7 @@
                         </a:rPr>
                         <a:t>/all</a:t>
                       </a:r>
-                      <a:endParaRPr lang="id-ID" dirty="0">
+                      <a:endParaRPr lang="id-ID" sz="1400" dirty="0">
                         <a:effectLst/>
                         <a:latin typeface="Courier New" panose="02070309020205020404" pitchFamily="49" charset="0"/>
                         <a:cs typeface="Courier New" panose="02070309020205020404" pitchFamily="49" charset="0"/>
@@ -10796,7 +11242,7 @@
                         </a:spcAft>
                       </a:pPr>
                       <a:r>
-                        <a:rPr lang="id-ID" sz="1600" b="1" u="none" strike="noStrike" dirty="0">
+                        <a:rPr lang="id-ID" sz="1400" b="1" u="none" strike="noStrike" dirty="0">
                           <a:solidFill>
                             <a:srgbClr val="0F0C0D"/>
                           </a:solidFill>
@@ -10807,7 +11253,7 @@
                         <a:t>localhost:3000/</a:t>
                       </a:r>
                       <a:r>
-                        <a:rPr lang="id-ID" sz="1600" b="1" u="none" strike="noStrike" dirty="0" err="1">
+                        <a:rPr lang="id-ID" sz="1400" b="1" u="none" strike="noStrike" dirty="0" err="1">
                           <a:solidFill>
                             <a:srgbClr val="0F0C0D"/>
                           </a:solidFill>
@@ -10817,7 +11263,7 @@
                         </a:rPr>
                         <a:t>carts</a:t>
                       </a:r>
-                      <a:endParaRPr lang="id-ID" dirty="0">
+                      <a:endParaRPr lang="id-ID" sz="1400" dirty="0">
                         <a:effectLst/>
                         <a:latin typeface="Courier New" panose="02070309020205020404" pitchFamily="49" charset="0"/>
                         <a:cs typeface="Courier New" panose="02070309020205020404" pitchFamily="49" charset="0"/>
@@ -10919,7 +11365,7 @@
                         </a:spcAft>
                       </a:pPr>
                       <a:r>
-                        <a:rPr lang="id-ID" sz="1600" b="1" u="none" strike="noStrike" dirty="0">
+                        <a:rPr lang="id-ID" sz="1400" b="1" u="none" strike="noStrike" dirty="0">
                           <a:solidFill>
                             <a:srgbClr val="0F0C0D"/>
                           </a:solidFill>
@@ -10930,7 +11376,7 @@
                         <a:t>localhost:3000/</a:t>
                       </a:r>
                       <a:r>
-                        <a:rPr lang="id-ID" sz="1600" b="1" u="none" strike="noStrike" dirty="0" err="1">
+                        <a:rPr lang="id-ID" sz="1400" b="1" u="none" strike="noStrike" dirty="0" err="1">
                           <a:solidFill>
                             <a:srgbClr val="0F0C0D"/>
                           </a:solidFill>
@@ -10941,7 +11387,7 @@
                         <a:t>carts</a:t>
                       </a:r>
                       <a:r>
-                        <a:rPr lang="id-ID" sz="1600" b="1" u="none" strike="noStrike" dirty="0">
+                        <a:rPr lang="id-ID" sz="1400" b="1" u="none" strike="noStrike" dirty="0">
                           <a:solidFill>
                             <a:srgbClr val="0F0C0D"/>
                           </a:solidFill>
@@ -10952,7 +11398,7 @@
                         <a:t>/</a:t>
                       </a:r>
                       <a:r>
-                        <a:rPr lang="id-ID" sz="1600" b="1" u="none" strike="noStrike" dirty="0" err="1">
+                        <a:rPr lang="id-ID" sz="1400" b="1" u="none" strike="noStrike" dirty="0" err="1">
                           <a:solidFill>
                             <a:srgbClr val="0F0C0D"/>
                           </a:solidFill>
@@ -10962,7 +11408,7 @@
                         </a:rPr>
                         <a:t>add</a:t>
                       </a:r>
-                      <a:endParaRPr lang="id-ID" dirty="0">
+                      <a:endParaRPr lang="id-ID" sz="1400" dirty="0">
                         <a:effectLst/>
                         <a:latin typeface="Courier New" panose="02070309020205020404" pitchFamily="49" charset="0"/>
                         <a:cs typeface="Courier New" panose="02070309020205020404" pitchFamily="49" charset="0"/>
@@ -11087,7 +11533,7 @@
                   </a:ext>
                 </a:extLst>
               </a:tr>
-              <a:tr h="370840">
+              <a:tr h="0">
                 <a:tc>
                   <a:txBody>
                     <a:bodyPr/>
@@ -11145,7 +11591,7 @@
                         </a:spcAft>
                       </a:pPr>
                       <a:r>
-                        <a:rPr lang="id-ID" sz="1600" b="1" u="none" strike="noStrike" dirty="0">
+                        <a:rPr lang="id-ID" sz="1400" b="1" u="none" strike="noStrike" dirty="0">
                           <a:solidFill>
                             <a:srgbClr val="0F0C0D"/>
                           </a:solidFill>
@@ -11156,7 +11602,7 @@
                         <a:t>localhost:3000/</a:t>
                       </a:r>
                       <a:r>
-                        <a:rPr lang="id-ID" sz="1600" b="1" u="none" strike="noStrike" dirty="0" err="1">
+                        <a:rPr lang="id-ID" sz="1400" b="1" u="none" strike="noStrike" dirty="0" err="1">
                           <a:solidFill>
                             <a:srgbClr val="0F0C0D"/>
                           </a:solidFill>
@@ -11167,7 +11613,7 @@
                         <a:t>carts</a:t>
                       </a:r>
                       <a:r>
-                        <a:rPr lang="id-ID" sz="1600" b="1" u="none" strike="noStrike" dirty="0">
+                        <a:rPr lang="id-ID" sz="1400" b="1" u="none" strike="noStrike" dirty="0">
                           <a:solidFill>
                             <a:srgbClr val="0F0C0D"/>
                           </a:solidFill>
@@ -11178,7 +11624,7 @@
                         <a:t>/</a:t>
                       </a:r>
                       <a:r>
-                        <a:rPr lang="id-ID" sz="1600" b="1" u="none" strike="noStrike" dirty="0" err="1">
+                        <a:rPr lang="id-ID" sz="1400" b="1" u="none" strike="noStrike" dirty="0" err="1">
                           <a:solidFill>
                             <a:srgbClr val="0F0C0D"/>
                           </a:solidFill>
@@ -11188,7 +11634,7 @@
                         </a:rPr>
                         <a:t>checkout</a:t>
                       </a:r>
-                      <a:endParaRPr lang="id-ID" dirty="0">
+                      <a:endParaRPr lang="id-ID" sz="1400" dirty="0">
                         <a:effectLst/>
                         <a:latin typeface="Courier New" panose="02070309020205020404" pitchFamily="49" charset="0"/>
                         <a:cs typeface="Courier New" panose="02070309020205020404" pitchFamily="49" charset="0"/>
@@ -11202,6 +11648,200 @@
                     <a:bodyPr/>
                     <a:lstStyle/>
                     <a:p>
+                      <a:pPr marL="0" marR="0" lvl="0" indent="0" algn="l" defTabSz="914400" rtl="0" eaLnBrk="1" fontAlgn="ctr" latinLnBrk="0" hangingPunct="1">
+                        <a:lnSpc>
+                          <a:spcPct val="100000"/>
+                        </a:lnSpc>
+                        <a:spcBef>
+                          <a:spcPts val="0"/>
+                        </a:spcBef>
+                        <a:spcAft>
+                          <a:spcPts val="0"/>
+                        </a:spcAft>
+                        <a:buClrTx/>
+                        <a:buSzTx/>
+                        <a:buFontTx/>
+                        <a:buNone/>
+                        <a:tabLst/>
+                        <a:defRPr/>
+                      </a:pPr>
+                      <a:r>
+                        <a:rPr lang="en-US" sz="1400" b="0" u="none" strike="noStrike" dirty="0">
+                          <a:solidFill>
+                            <a:srgbClr val="000000"/>
+                          </a:solidFill>
+                          <a:effectLst/>
+                        </a:rPr>
+                        <a:t>Checkout </a:t>
+                      </a:r>
+                      <a:r>
+                        <a:rPr lang="en-US" sz="1400" b="0" u="none" strike="noStrike" dirty="0" err="1">
+                          <a:solidFill>
+                            <a:srgbClr val="000000"/>
+                          </a:solidFill>
+                          <a:effectLst/>
+                        </a:rPr>
+                        <a:t>semua</a:t>
+                      </a:r>
+                      <a:r>
+                        <a:rPr lang="en-US" sz="1400" b="0" u="none" strike="noStrike" dirty="0">
+                          <a:solidFill>
+                            <a:srgbClr val="000000"/>
+                          </a:solidFill>
+                          <a:effectLst/>
+                        </a:rPr>
+                        <a:t> </a:t>
+                      </a:r>
+                      <a:r>
+                        <a:rPr lang="en-US" sz="1400" b="0" u="none" strike="noStrike" dirty="0" err="1">
+                          <a:solidFill>
+                            <a:srgbClr val="000000"/>
+                          </a:solidFill>
+                          <a:effectLst/>
+                        </a:rPr>
+                        <a:t>barang</a:t>
+                      </a:r>
+                      <a:r>
+                        <a:rPr lang="en-US" sz="1400" b="0" u="none" strike="noStrike" dirty="0">
+                          <a:solidFill>
+                            <a:srgbClr val="000000"/>
+                          </a:solidFill>
+                          <a:effectLst/>
+                        </a:rPr>
+                        <a:t> di cart  </a:t>
+                      </a:r>
+                    </a:p>
+                    <a:p>
+                      <a:pPr marL="0" marR="0" lvl="0" indent="0" algn="l" defTabSz="914400" rtl="0" eaLnBrk="1" fontAlgn="ctr" latinLnBrk="0" hangingPunct="1">
+                        <a:lnSpc>
+                          <a:spcPct val="100000"/>
+                        </a:lnSpc>
+                        <a:spcBef>
+                          <a:spcPts val="0"/>
+                        </a:spcBef>
+                        <a:spcAft>
+                          <a:spcPts val="0"/>
+                        </a:spcAft>
+                        <a:buClrTx/>
+                        <a:buSzTx/>
+                        <a:buFontTx/>
+                        <a:buNone/>
+                        <a:tabLst/>
+                        <a:defRPr/>
+                      </a:pPr>
+                      <a:r>
+                        <a:rPr lang="en-US" sz="1400" b="0" u="none" strike="noStrike" dirty="0" err="1">
+                          <a:solidFill>
+                            <a:srgbClr val="000000"/>
+                          </a:solidFill>
+                          <a:effectLst/>
+                        </a:rPr>
+                        <a:t>kalkulasi</a:t>
+                      </a:r>
+                      <a:r>
+                        <a:rPr lang="en-US" sz="1400" b="0" u="none" strike="noStrike" dirty="0">
+                          <a:solidFill>
+                            <a:srgbClr val="000000"/>
+                          </a:solidFill>
+                          <a:effectLst/>
+                        </a:rPr>
+                        <a:t> </a:t>
+                      </a:r>
+                      <a:r>
+                        <a:rPr lang="en-US" sz="1400" b="0" u="none" strike="noStrike" dirty="0" err="1">
+                          <a:solidFill>
+                            <a:srgbClr val="000000"/>
+                          </a:solidFill>
+                          <a:effectLst/>
+                        </a:rPr>
+                        <a:t>diskon</a:t>
+                      </a:r>
+                      <a:r>
+                        <a:rPr lang="en-US" sz="1400" b="0" u="none" strike="noStrike" dirty="0">
+                          <a:solidFill>
+                            <a:srgbClr val="000000"/>
+                          </a:solidFill>
+                          <a:effectLst/>
+                        </a:rPr>
+                        <a:t>, </a:t>
+                      </a:r>
+                      <a:r>
+                        <a:rPr lang="en-US" sz="1400" b="0" u="none" strike="noStrike" dirty="0" err="1">
+                          <a:solidFill>
+                            <a:srgbClr val="000000"/>
+                          </a:solidFill>
+                          <a:effectLst/>
+                        </a:rPr>
+                        <a:t>pajak</a:t>
+                      </a:r>
+                      <a:r>
+                        <a:rPr lang="en-US" sz="1400" b="0" u="none" strike="noStrike" dirty="0">
+                          <a:solidFill>
+                            <a:srgbClr val="000000"/>
+                          </a:solidFill>
+                          <a:effectLst/>
+                        </a:rPr>
+                        <a:t>, dan </a:t>
+                      </a:r>
+                      <a:r>
+                        <a:rPr lang="en-US" sz="1400" b="0" u="none" strike="noStrike" dirty="0" err="1">
+                          <a:solidFill>
+                            <a:srgbClr val="000000"/>
+                          </a:solidFill>
+                          <a:effectLst/>
+                        </a:rPr>
+                        <a:t>jumlah</a:t>
+                      </a:r>
+                      <a:r>
+                        <a:rPr lang="en-US" sz="1400" b="0" u="none" strike="noStrike" dirty="0">
+                          <a:solidFill>
+                            <a:srgbClr val="000000"/>
+                          </a:solidFill>
+                          <a:effectLst/>
+                        </a:rPr>
+                        <a:t> </a:t>
+                      </a:r>
+                      <a:r>
+                        <a:rPr lang="en-US" sz="1400" b="0" u="none" strike="noStrike" dirty="0" err="1">
+                          <a:solidFill>
+                            <a:srgbClr val="000000"/>
+                          </a:solidFill>
+                          <a:effectLst/>
+                        </a:rPr>
+                        <a:t>harga</a:t>
+                      </a:r>
+                      <a:r>
+                        <a:rPr lang="en-US" sz="1400" b="0" u="none" strike="noStrike" dirty="0">
+                          <a:solidFill>
+                            <a:srgbClr val="000000"/>
+                          </a:solidFill>
+                          <a:effectLst/>
+                        </a:rPr>
+                        <a:t> di </a:t>
+                      </a:r>
+                      <a:r>
+                        <a:rPr lang="en-US" sz="1400" b="0" u="none" strike="noStrike" dirty="0" err="1">
+                          <a:solidFill>
+                            <a:srgbClr val="000000"/>
+                          </a:solidFill>
+                          <a:effectLst/>
+                        </a:rPr>
+                        <a:t>tabel</a:t>
+                      </a:r>
+                      <a:r>
+                        <a:rPr lang="en-US" sz="1400" b="0" u="none" strike="noStrike" dirty="0">
+                          <a:solidFill>
+                            <a:srgbClr val="000000"/>
+                          </a:solidFill>
+                          <a:effectLst/>
+                        </a:rPr>
+                        <a:t> order</a:t>
+                      </a:r>
+                      <a:endParaRPr lang="id-ID" sz="1400" dirty="0">
+                        <a:effectLst/>
+                      </a:endParaRPr>
+                    </a:p>
+                    <a:p>
                       <a:pPr rtl="0" fontAlgn="ctr">
                         <a:spcBef>
                           <a:spcPts val="0"/>
@@ -11210,51 +11850,6 @@
                           <a:spcPts val="0"/>
                         </a:spcAft>
                       </a:pPr>
-                      <a:r>
-                        <a:rPr lang="en-US" sz="1600" b="0" u="none" strike="noStrike" dirty="0">
-                          <a:solidFill>
-                            <a:srgbClr val="000000"/>
-                          </a:solidFill>
-                          <a:effectLst/>
-                        </a:rPr>
-                        <a:t>Checkout </a:t>
-                      </a:r>
-                      <a:r>
-                        <a:rPr lang="en-US" sz="1600" b="0" u="none" strike="noStrike" dirty="0" err="1">
-                          <a:solidFill>
-                            <a:srgbClr val="000000"/>
-                          </a:solidFill>
-                          <a:effectLst/>
-                        </a:rPr>
-                        <a:t>semua</a:t>
-                      </a:r>
-                      <a:r>
-                        <a:rPr lang="en-US" sz="1600" b="0" u="none" strike="noStrike" dirty="0">
-                          <a:solidFill>
-                            <a:srgbClr val="000000"/>
-                          </a:solidFill>
-                          <a:effectLst/>
-                        </a:rPr>
-                        <a:t> </a:t>
-                      </a:r>
-                      <a:r>
-                        <a:rPr lang="en-US" sz="1600" b="0" u="none" strike="noStrike" dirty="0" err="1">
-                          <a:solidFill>
-                            <a:srgbClr val="000000"/>
-                          </a:solidFill>
-                          <a:effectLst/>
-                        </a:rPr>
-                        <a:t>barang</a:t>
-                      </a:r>
-                      <a:r>
-                        <a:rPr lang="en-US" sz="1600" b="0" u="none" strike="noStrike" dirty="0">
-                          <a:solidFill>
-                            <a:srgbClr val="000000"/>
-                          </a:solidFill>
-                          <a:effectLst/>
-                        </a:rPr>
-                        <a:t> di cart</a:t>
-                      </a:r>
                       <a:endParaRPr lang="en-US" dirty="0">
                         <a:effectLst/>
                       </a:endParaRPr>

</xml_diff>